<commit_message>
Production reading and data saving finished.
</commit_message>
<xml_diff>
--- a/syntactic analysis design.pptx
+++ b/syntactic analysis design.pptx
@@ -7,10 +7,10 @@
   <p:sldIdLst>
     <p:sldId id="256" r:id="rId2"/>
     <p:sldId id="264" r:id="rId3"/>
-    <p:sldId id="257" r:id="rId4"/>
-    <p:sldId id="258" r:id="rId5"/>
-    <p:sldId id="259" r:id="rId6"/>
-    <p:sldId id="260" r:id="rId7"/>
+    <p:sldId id="259" r:id="rId4"/>
+    <p:sldId id="260" r:id="rId5"/>
+    <p:sldId id="257" r:id="rId6"/>
+    <p:sldId id="258" r:id="rId7"/>
     <p:sldId id="261" r:id="rId8"/>
     <p:sldId id="262" r:id="rId9"/>
     <p:sldId id="263" r:id="rId10"/>
@@ -271,7 +271,7 @@
           <a:p>
             <a:fld id="{B8248D91-5226-428C-9960-7986E2C730AF}" type="datetimeFigureOut">
               <a:rPr lang="zh-CN" altLang="en-US" smtClean="0"/>
-              <a:t>2020/4/13</a:t>
+              <a:t>2020/4/14</a:t>
             </a:fld>
             <a:endParaRPr lang="zh-CN" altLang="en-US"/>
           </a:p>
@@ -469,7 +469,7 @@
           <a:p>
             <a:fld id="{B8248D91-5226-428C-9960-7986E2C730AF}" type="datetimeFigureOut">
               <a:rPr lang="zh-CN" altLang="en-US" smtClean="0"/>
-              <a:t>2020/4/13</a:t>
+              <a:t>2020/4/14</a:t>
             </a:fld>
             <a:endParaRPr lang="zh-CN" altLang="en-US"/>
           </a:p>
@@ -677,7 +677,7 @@
           <a:p>
             <a:fld id="{B8248D91-5226-428C-9960-7986E2C730AF}" type="datetimeFigureOut">
               <a:rPr lang="zh-CN" altLang="en-US" smtClean="0"/>
-              <a:t>2020/4/13</a:t>
+              <a:t>2020/4/14</a:t>
             </a:fld>
             <a:endParaRPr lang="zh-CN" altLang="en-US"/>
           </a:p>
@@ -875,7 +875,7 @@
           <a:p>
             <a:fld id="{B8248D91-5226-428C-9960-7986E2C730AF}" type="datetimeFigureOut">
               <a:rPr lang="zh-CN" altLang="en-US" smtClean="0"/>
-              <a:t>2020/4/13</a:t>
+              <a:t>2020/4/14</a:t>
             </a:fld>
             <a:endParaRPr lang="zh-CN" altLang="en-US"/>
           </a:p>
@@ -1150,7 +1150,7 @@
           <a:p>
             <a:fld id="{B8248D91-5226-428C-9960-7986E2C730AF}" type="datetimeFigureOut">
               <a:rPr lang="zh-CN" altLang="en-US" smtClean="0"/>
-              <a:t>2020/4/13</a:t>
+              <a:t>2020/4/14</a:t>
             </a:fld>
             <a:endParaRPr lang="zh-CN" altLang="en-US"/>
           </a:p>
@@ -1415,7 +1415,7 @@
           <a:p>
             <a:fld id="{B8248D91-5226-428C-9960-7986E2C730AF}" type="datetimeFigureOut">
               <a:rPr lang="zh-CN" altLang="en-US" smtClean="0"/>
-              <a:t>2020/4/13</a:t>
+              <a:t>2020/4/14</a:t>
             </a:fld>
             <a:endParaRPr lang="zh-CN" altLang="en-US"/>
           </a:p>
@@ -1827,7 +1827,7 @@
           <a:p>
             <a:fld id="{B8248D91-5226-428C-9960-7986E2C730AF}" type="datetimeFigureOut">
               <a:rPr lang="zh-CN" altLang="en-US" smtClean="0"/>
-              <a:t>2020/4/13</a:t>
+              <a:t>2020/4/14</a:t>
             </a:fld>
             <a:endParaRPr lang="zh-CN" altLang="en-US"/>
           </a:p>
@@ -1968,7 +1968,7 @@
           <a:p>
             <a:fld id="{B8248D91-5226-428C-9960-7986E2C730AF}" type="datetimeFigureOut">
               <a:rPr lang="zh-CN" altLang="en-US" smtClean="0"/>
-              <a:t>2020/4/13</a:t>
+              <a:t>2020/4/14</a:t>
             </a:fld>
             <a:endParaRPr lang="zh-CN" altLang="en-US"/>
           </a:p>
@@ -2081,7 +2081,7 @@
           <a:p>
             <a:fld id="{B8248D91-5226-428C-9960-7986E2C730AF}" type="datetimeFigureOut">
               <a:rPr lang="zh-CN" altLang="en-US" smtClean="0"/>
-              <a:t>2020/4/13</a:t>
+              <a:t>2020/4/14</a:t>
             </a:fld>
             <a:endParaRPr lang="zh-CN" altLang="en-US"/>
           </a:p>
@@ -2392,7 +2392,7 @@
           <a:p>
             <a:fld id="{B8248D91-5226-428C-9960-7986E2C730AF}" type="datetimeFigureOut">
               <a:rPr lang="zh-CN" altLang="en-US" smtClean="0"/>
-              <a:t>2020/4/13</a:t>
+              <a:t>2020/4/14</a:t>
             </a:fld>
             <a:endParaRPr lang="zh-CN" altLang="en-US"/>
           </a:p>
@@ -2680,7 +2680,7 @@
           <a:p>
             <a:fld id="{B8248D91-5226-428C-9960-7986E2C730AF}" type="datetimeFigureOut">
               <a:rPr lang="zh-CN" altLang="en-US" smtClean="0"/>
-              <a:t>2020/4/13</a:t>
+              <a:t>2020/4/14</a:t>
             </a:fld>
             <a:endParaRPr lang="zh-CN" altLang="en-US"/>
           </a:p>
@@ -2921,7 +2921,7 @@
           <a:p>
             <a:fld id="{B8248D91-5226-428C-9960-7986E2C730AF}" type="datetimeFigureOut">
               <a:rPr lang="zh-CN" altLang="en-US" smtClean="0"/>
-              <a:t>2020/4/13</a:t>
+              <a:t>2020/4/14</a:t>
             </a:fld>
             <a:endParaRPr lang="zh-CN" altLang="en-US"/>
           </a:p>
@@ -3580,6 +3580,126 @@
       </p:grpSpPr>
       <p:pic>
         <p:nvPicPr>
+          <p:cNvPr id="13" name="图片 12">
+            <a:extLst>
+              <a:ext uri="{FF2B5EF4-FFF2-40B4-BE49-F238E27FC236}">
+                <a16:creationId xmlns:a16="http://schemas.microsoft.com/office/drawing/2014/main" id="{B9311E93-F7B3-4F2A-84AF-19CDA5DA2AC9}"/>
+              </a:ext>
+            </a:extLst>
+          </p:cNvPr>
+          <p:cNvPicPr>
+            <a:picLocks noChangeAspect="1"/>
+          </p:cNvPicPr>
+          <p:nvPr/>
+        </p:nvPicPr>
+        <p:blipFill>
+          <a:blip r:embed="rId2"/>
+          <a:stretch>
+            <a:fillRect/>
+          </a:stretch>
+        </p:blipFill>
+        <p:spPr>
+          <a:xfrm>
+            <a:off x="1618100" y="966002"/>
+            <a:ext cx="8955800" cy="4925995"/>
+          </a:xfrm>
+          <a:prstGeom prst="rect">
+            <a:avLst/>
+          </a:prstGeom>
+        </p:spPr>
+      </p:pic>
+    </p:spTree>
+    <p:extLst>
+      <p:ext uri="{BB962C8B-B14F-4D97-AF65-F5344CB8AC3E}">
+        <p14:creationId xmlns:p14="http://schemas.microsoft.com/office/powerpoint/2010/main" val="584503625"/>
+      </p:ext>
+    </p:extLst>
+  </p:cSld>
+  <p:clrMapOvr>
+    <a:masterClrMapping/>
+  </p:clrMapOvr>
+</p:sld>
+</file>
+
+<file path=ppt/slides/slide4.xml><?xml version="1.0" encoding="utf-8"?>
+<p:sld xmlns:a="http://schemas.openxmlformats.org/drawingml/2006/main" xmlns:r="http://schemas.openxmlformats.org/officeDocument/2006/relationships" xmlns:p="http://schemas.openxmlformats.org/presentationml/2006/main">
+  <p:cSld>
+    <p:spTree>
+      <p:nvGrpSpPr>
+        <p:cNvPr id="1" name=""/>
+        <p:cNvGrpSpPr/>
+        <p:nvPr/>
+      </p:nvGrpSpPr>
+      <p:grpSpPr>
+        <a:xfrm>
+          <a:off x="0" y="0"/>
+          <a:ext cx="0" cy="0"/>
+          <a:chOff x="0" y="0"/>
+          <a:chExt cx="0" cy="0"/>
+        </a:xfrm>
+      </p:grpSpPr>
+      <p:pic>
+        <p:nvPicPr>
+          <p:cNvPr id="4" name="图片 3">
+            <a:extLst>
+              <a:ext uri="{FF2B5EF4-FFF2-40B4-BE49-F238E27FC236}">
+                <a16:creationId xmlns:a16="http://schemas.microsoft.com/office/drawing/2014/main" id="{1F5E2E4E-2DF8-48E8-9592-DB9D3A133EED}"/>
+              </a:ext>
+            </a:extLst>
+          </p:cNvPr>
+          <p:cNvPicPr>
+            <a:picLocks noChangeAspect="1"/>
+          </p:cNvPicPr>
+          <p:nvPr/>
+        </p:nvPicPr>
+        <p:blipFill>
+          <a:blip r:embed="rId2"/>
+          <a:stretch>
+            <a:fillRect/>
+          </a:stretch>
+        </p:blipFill>
+        <p:spPr>
+          <a:xfrm>
+            <a:off x="1743078" y="935520"/>
+            <a:ext cx="8705843" cy="4986960"/>
+          </a:xfrm>
+          <a:prstGeom prst="rect">
+            <a:avLst/>
+          </a:prstGeom>
+        </p:spPr>
+      </p:pic>
+    </p:spTree>
+    <p:extLst>
+      <p:ext uri="{BB962C8B-B14F-4D97-AF65-F5344CB8AC3E}">
+        <p14:creationId xmlns:p14="http://schemas.microsoft.com/office/powerpoint/2010/main" val="1565101925"/>
+      </p:ext>
+    </p:extLst>
+  </p:cSld>
+  <p:clrMapOvr>
+    <a:masterClrMapping/>
+  </p:clrMapOvr>
+</p:sld>
+</file>
+
+<file path=ppt/slides/slide5.xml><?xml version="1.0" encoding="utf-8"?>
+<p:sld xmlns:a="http://schemas.openxmlformats.org/drawingml/2006/main" xmlns:r="http://schemas.openxmlformats.org/officeDocument/2006/relationships" xmlns:p="http://schemas.openxmlformats.org/presentationml/2006/main">
+  <p:cSld>
+    <p:spTree>
+      <p:nvGrpSpPr>
+        <p:cNvPr id="1" name=""/>
+        <p:cNvGrpSpPr/>
+        <p:nvPr/>
+      </p:nvGrpSpPr>
+      <p:grpSpPr>
+        <a:xfrm>
+          <a:off x="0" y="0"/>
+          <a:ext cx="0" cy="0"/>
+          <a:chOff x="0" y="0"/>
+          <a:chExt cx="0" cy="0"/>
+        </a:xfrm>
+      </p:grpSpPr>
+      <p:pic>
+        <p:nvPicPr>
           <p:cNvPr id="51" name="图片 50">
             <a:extLst>
               <a:ext uri="{FF2B5EF4-FFF2-40B4-BE49-F238E27FC236}">
@@ -3621,7 +3741,7 @@
 </p:sld>
 </file>
 
-<file path=ppt/slides/slide4.xml><?xml version="1.0" encoding="utf-8"?>
+<file path=ppt/slides/slide6.xml><?xml version="1.0" encoding="utf-8"?>
 <p:sld xmlns:a="http://schemas.openxmlformats.org/drawingml/2006/main" xmlns:r="http://schemas.openxmlformats.org/officeDocument/2006/relationships" xmlns:p="http://schemas.openxmlformats.org/presentationml/2006/main">
   <p:cSld>
     <p:spTree>
@@ -3672,126 +3792,6 @@
     <p:extLst>
       <p:ext uri="{BB962C8B-B14F-4D97-AF65-F5344CB8AC3E}">
         <p14:creationId xmlns:p14="http://schemas.microsoft.com/office/powerpoint/2010/main" val="493224198"/>
-      </p:ext>
-    </p:extLst>
-  </p:cSld>
-  <p:clrMapOvr>
-    <a:masterClrMapping/>
-  </p:clrMapOvr>
-</p:sld>
-</file>
-
-<file path=ppt/slides/slide5.xml><?xml version="1.0" encoding="utf-8"?>
-<p:sld xmlns:a="http://schemas.openxmlformats.org/drawingml/2006/main" xmlns:r="http://schemas.openxmlformats.org/officeDocument/2006/relationships" xmlns:p="http://schemas.openxmlformats.org/presentationml/2006/main">
-  <p:cSld>
-    <p:spTree>
-      <p:nvGrpSpPr>
-        <p:cNvPr id="1" name=""/>
-        <p:cNvGrpSpPr/>
-        <p:nvPr/>
-      </p:nvGrpSpPr>
-      <p:grpSpPr>
-        <a:xfrm>
-          <a:off x="0" y="0"/>
-          <a:ext cx="0" cy="0"/>
-          <a:chOff x="0" y="0"/>
-          <a:chExt cx="0" cy="0"/>
-        </a:xfrm>
-      </p:grpSpPr>
-      <p:pic>
-        <p:nvPicPr>
-          <p:cNvPr id="13" name="图片 12">
-            <a:extLst>
-              <a:ext uri="{FF2B5EF4-FFF2-40B4-BE49-F238E27FC236}">
-                <a16:creationId xmlns:a16="http://schemas.microsoft.com/office/drawing/2014/main" id="{B9311E93-F7B3-4F2A-84AF-19CDA5DA2AC9}"/>
-              </a:ext>
-            </a:extLst>
-          </p:cNvPr>
-          <p:cNvPicPr>
-            <a:picLocks noChangeAspect="1"/>
-          </p:cNvPicPr>
-          <p:nvPr/>
-        </p:nvPicPr>
-        <p:blipFill>
-          <a:blip r:embed="rId2"/>
-          <a:stretch>
-            <a:fillRect/>
-          </a:stretch>
-        </p:blipFill>
-        <p:spPr>
-          <a:xfrm>
-            <a:off x="1618100" y="966002"/>
-            <a:ext cx="8955800" cy="4925995"/>
-          </a:xfrm>
-          <a:prstGeom prst="rect">
-            <a:avLst/>
-          </a:prstGeom>
-        </p:spPr>
-      </p:pic>
-    </p:spTree>
-    <p:extLst>
-      <p:ext uri="{BB962C8B-B14F-4D97-AF65-F5344CB8AC3E}">
-        <p14:creationId xmlns:p14="http://schemas.microsoft.com/office/powerpoint/2010/main" val="584503625"/>
-      </p:ext>
-    </p:extLst>
-  </p:cSld>
-  <p:clrMapOvr>
-    <a:masterClrMapping/>
-  </p:clrMapOvr>
-</p:sld>
-</file>
-
-<file path=ppt/slides/slide6.xml><?xml version="1.0" encoding="utf-8"?>
-<p:sld xmlns:a="http://schemas.openxmlformats.org/drawingml/2006/main" xmlns:r="http://schemas.openxmlformats.org/officeDocument/2006/relationships" xmlns:p="http://schemas.openxmlformats.org/presentationml/2006/main">
-  <p:cSld>
-    <p:spTree>
-      <p:nvGrpSpPr>
-        <p:cNvPr id="1" name=""/>
-        <p:cNvGrpSpPr/>
-        <p:nvPr/>
-      </p:nvGrpSpPr>
-      <p:grpSpPr>
-        <a:xfrm>
-          <a:off x="0" y="0"/>
-          <a:ext cx="0" cy="0"/>
-          <a:chOff x="0" y="0"/>
-          <a:chExt cx="0" cy="0"/>
-        </a:xfrm>
-      </p:grpSpPr>
-      <p:pic>
-        <p:nvPicPr>
-          <p:cNvPr id="4" name="图片 3">
-            <a:extLst>
-              <a:ext uri="{FF2B5EF4-FFF2-40B4-BE49-F238E27FC236}">
-                <a16:creationId xmlns:a16="http://schemas.microsoft.com/office/drawing/2014/main" id="{1F5E2E4E-2DF8-48E8-9592-DB9D3A133EED}"/>
-              </a:ext>
-            </a:extLst>
-          </p:cNvPr>
-          <p:cNvPicPr>
-            <a:picLocks noChangeAspect="1"/>
-          </p:cNvPicPr>
-          <p:nvPr/>
-        </p:nvPicPr>
-        <p:blipFill>
-          <a:blip r:embed="rId2"/>
-          <a:stretch>
-            <a:fillRect/>
-          </a:stretch>
-        </p:blipFill>
-        <p:spPr>
-          <a:xfrm>
-            <a:off x="1743078" y="935520"/>
-            <a:ext cx="8705843" cy="4986960"/>
-          </a:xfrm>
-          <a:prstGeom prst="rect">
-            <a:avLst/>
-          </a:prstGeom>
-        </p:spPr>
-      </p:pic>
-    </p:spTree>
-    <p:extLst>
-      <p:ext uri="{BB962C8B-B14F-4D97-AF65-F5344CB8AC3E}">
-        <p14:creationId xmlns:p14="http://schemas.microsoft.com/office/powerpoint/2010/main" val="1565101925"/>
       </p:ext>
     </p:extLst>
   </p:cSld>

</xml_diff>